<commit_message>
Aspnetcore logging update1 (#77)
* upd pict

* update aca
</commit_message>
<xml_diff>
--- a/aspnetcore-logging/images/figures.pptx
+++ b/aspnetcore-logging/images/figures.pptx
@@ -5,9 +5,13 @@
     <p:sldMasterId id="2147483648" r:id="rId1"/>
   </p:sldMasterIdLst>
   <p:sldIdLst>
-    <p:sldId id="256" r:id="rId2"/>
-    <p:sldId id="257" r:id="rId3"/>
-    <p:sldId id="258" r:id="rId4"/>
+    <p:sldId id="259" r:id="rId2"/>
+    <p:sldId id="256" r:id="rId3"/>
+    <p:sldId id="257" r:id="rId4"/>
+    <p:sldId id="258" r:id="rId5"/>
+    <p:sldId id="260" r:id="rId6"/>
+    <p:sldId id="261" r:id="rId7"/>
+    <p:sldId id="262" r:id="rId8"/>
   </p:sldIdLst>
   <p:sldSz cx="12192000" cy="6858000"/>
   <p:notesSz cx="6858000" cy="9144000"/>
@@ -106,6 +110,11 @@
       </a:defRPr>
     </a:lvl9pPr>
   </p:defaultTextStyle>
+  <p:extLst>
+    <p:ext uri="{EFAFB233-063F-42B5-8137-9DF3F51BA10A}">
+      <p15:sldGuideLst xmlns:p15="http://schemas.microsoft.com/office/powerpoint/2012/main"/>
+    </p:ext>
+  </p:extLst>
 </p:presentation>
 </file>
 
@@ -362,7 +371,7 @@
           <a:p>
             <a:fld id="{9D0AAA26-702B-FC44-AB7A-2ED51E25FFA1}" type="datetimeFigureOut">
               <a:rPr kumimoji="1" lang="ja-JP" altLang="en-US" smtClean="0"/>
-              <a:t>2024/2/24</a:t>
+              <a:t>2024/2/26</a:t>
             </a:fld>
             <a:endParaRPr kumimoji="1" lang="ja-JP" altLang="en-US"/>
           </a:p>
@@ -592,7 +601,7 @@
           <a:p>
             <a:fld id="{9D0AAA26-702B-FC44-AB7A-2ED51E25FFA1}" type="datetimeFigureOut">
               <a:rPr kumimoji="1" lang="ja-JP" altLang="en-US" smtClean="0"/>
-              <a:t>2024/2/24</a:t>
+              <a:t>2024/2/26</a:t>
             </a:fld>
             <a:endParaRPr kumimoji="1" lang="ja-JP" altLang="en-US"/>
           </a:p>
@@ -832,7 +841,7 @@
           <a:p>
             <a:fld id="{9D0AAA26-702B-FC44-AB7A-2ED51E25FFA1}" type="datetimeFigureOut">
               <a:rPr kumimoji="1" lang="ja-JP" altLang="en-US" smtClean="0"/>
-              <a:t>2024/2/24</a:t>
+              <a:t>2024/2/26</a:t>
             </a:fld>
             <a:endParaRPr kumimoji="1" lang="ja-JP" altLang="en-US"/>
           </a:p>
@@ -1062,7 +1071,7 @@
           <a:p>
             <a:fld id="{9D0AAA26-702B-FC44-AB7A-2ED51E25FFA1}" type="datetimeFigureOut">
               <a:rPr kumimoji="1" lang="ja-JP" altLang="en-US" smtClean="0"/>
-              <a:t>2024/2/24</a:t>
+              <a:t>2024/2/26</a:t>
             </a:fld>
             <a:endParaRPr kumimoji="1" lang="ja-JP" altLang="en-US"/>
           </a:p>
@@ -1337,7 +1346,7 @@
           <a:p>
             <a:fld id="{9D0AAA26-702B-FC44-AB7A-2ED51E25FFA1}" type="datetimeFigureOut">
               <a:rPr kumimoji="1" lang="ja-JP" altLang="en-US" smtClean="0"/>
-              <a:t>2024/2/24</a:t>
+              <a:t>2024/2/26</a:t>
             </a:fld>
             <a:endParaRPr kumimoji="1" lang="ja-JP" altLang="en-US"/>
           </a:p>
@@ -1666,7 +1675,7 @@
           <a:p>
             <a:fld id="{9D0AAA26-702B-FC44-AB7A-2ED51E25FFA1}" type="datetimeFigureOut">
               <a:rPr kumimoji="1" lang="ja-JP" altLang="en-US" smtClean="0"/>
-              <a:t>2024/2/24</a:t>
+              <a:t>2024/2/26</a:t>
             </a:fld>
             <a:endParaRPr kumimoji="1" lang="ja-JP" altLang="en-US"/>
           </a:p>
@@ -2142,7 +2151,7 @@
           <a:p>
             <a:fld id="{9D0AAA26-702B-FC44-AB7A-2ED51E25FFA1}" type="datetimeFigureOut">
               <a:rPr kumimoji="1" lang="ja-JP" altLang="en-US" smtClean="0"/>
-              <a:t>2024/2/24</a:t>
+              <a:t>2024/2/26</a:t>
             </a:fld>
             <a:endParaRPr kumimoji="1" lang="ja-JP" altLang="en-US"/>
           </a:p>
@@ -2283,7 +2292,7 @@
           <a:p>
             <a:fld id="{9D0AAA26-702B-FC44-AB7A-2ED51E25FFA1}" type="datetimeFigureOut">
               <a:rPr kumimoji="1" lang="ja-JP" altLang="en-US" smtClean="0"/>
-              <a:t>2024/2/24</a:t>
+              <a:t>2024/2/26</a:t>
             </a:fld>
             <a:endParaRPr kumimoji="1" lang="ja-JP" altLang="en-US"/>
           </a:p>
@@ -2396,7 +2405,7 @@
           <a:p>
             <a:fld id="{9D0AAA26-702B-FC44-AB7A-2ED51E25FFA1}" type="datetimeFigureOut">
               <a:rPr kumimoji="1" lang="ja-JP" altLang="en-US" smtClean="0"/>
-              <a:t>2024/2/24</a:t>
+              <a:t>2024/2/26</a:t>
             </a:fld>
             <a:endParaRPr kumimoji="1" lang="ja-JP" altLang="en-US"/>
           </a:p>
@@ -2739,7 +2748,7 @@
           <a:p>
             <a:fld id="{9D0AAA26-702B-FC44-AB7A-2ED51E25FFA1}" type="datetimeFigureOut">
               <a:rPr kumimoji="1" lang="ja-JP" altLang="en-US" smtClean="0"/>
-              <a:t>2024/2/24</a:t>
+              <a:t>2024/2/26</a:t>
             </a:fld>
             <a:endParaRPr kumimoji="1" lang="ja-JP" altLang="en-US"/>
           </a:p>
@@ -3027,7 +3036,7 @@
           <a:p>
             <a:fld id="{9D0AAA26-702B-FC44-AB7A-2ED51E25FFA1}" type="datetimeFigureOut">
               <a:rPr kumimoji="1" lang="ja-JP" altLang="en-US" smtClean="0"/>
-              <a:t>2024/2/24</a:t>
+              <a:t>2024/2/26</a:t>
             </a:fld>
             <a:endParaRPr kumimoji="1" lang="ja-JP" altLang="en-US"/>
           </a:p>
@@ -3300,7 +3309,7 @@
           <a:p>
             <a:fld id="{9D0AAA26-702B-FC44-AB7A-2ED51E25FFA1}" type="datetimeFigureOut">
               <a:rPr kumimoji="1" lang="ja-JP" altLang="en-US" smtClean="0"/>
-              <a:t>2024/2/24</a:t>
+              <a:t>2024/2/26</a:t>
             </a:fld>
             <a:endParaRPr kumimoji="1" lang="ja-JP" altLang="en-US"/>
           </a:p>
@@ -3717,6 +3726,925 @@
           <a:chExt cx="0" cy="0"/>
         </a:xfrm>
       </p:grpSpPr>
+      <p:sp>
+        <p:nvSpPr>
+          <p:cNvPr id="32" name="正方形/長方形 31">
+            <a:extLst>
+              <a:ext uri="{FF2B5EF4-FFF2-40B4-BE49-F238E27FC236}">
+                <a16:creationId xmlns:a16="http://schemas.microsoft.com/office/drawing/2014/main" id="{A36CE03F-5E90-384A-0813-8619AC4C0F5F}"/>
+              </a:ext>
+            </a:extLst>
+          </p:cNvPr>
+          <p:cNvSpPr/>
+          <p:nvPr/>
+        </p:nvSpPr>
+        <p:spPr>
+          <a:xfrm>
+            <a:off x="536028" y="819807"/>
+            <a:ext cx="11193517" cy="5463878"/>
+          </a:xfrm>
+          <a:prstGeom prst="rect">
+            <a:avLst/>
+          </a:prstGeom>
+          <a:solidFill>
+            <a:schemeClr val="bg1"/>
+          </a:solidFill>
+          <a:ln>
+            <a:noFill/>
+          </a:ln>
+          <a:effectLst>
+            <a:outerShdw blurRad="50800" dist="38100" dir="2700000" algn="tl" rotWithShape="0">
+              <a:prstClr val="black">
+                <a:alpha val="40000"/>
+              </a:prstClr>
+            </a:outerShdw>
+          </a:effectLst>
+        </p:spPr>
+        <p:style>
+          <a:lnRef idx="2">
+            <a:schemeClr val="accent1">
+              <a:shade val="15000"/>
+            </a:schemeClr>
+          </a:lnRef>
+          <a:fillRef idx="1">
+            <a:schemeClr val="accent1"/>
+          </a:fillRef>
+          <a:effectRef idx="0">
+            <a:schemeClr val="accent1"/>
+          </a:effectRef>
+          <a:fontRef idx="minor">
+            <a:schemeClr val="lt1"/>
+          </a:fontRef>
+        </p:style>
+        <p:txBody>
+          <a:bodyPr rtlCol="0" anchor="ctr"/>
+          <a:lstStyle/>
+          <a:p>
+            <a:pPr algn="ctr"/>
+            <a:endParaRPr kumimoji="1" lang="ja-JP" altLang="en-US"/>
+          </a:p>
+        </p:txBody>
+      </p:sp>
+      <p:sp>
+        <p:nvSpPr>
+          <p:cNvPr id="3" name="正方形/長方形 2">
+            <a:extLst>
+              <a:ext uri="{FF2B5EF4-FFF2-40B4-BE49-F238E27FC236}">
+                <a16:creationId xmlns:a16="http://schemas.microsoft.com/office/drawing/2014/main" id="{DE7B1F25-5EAD-6F59-A3AB-83CA6E7F0A7F}"/>
+              </a:ext>
+            </a:extLst>
+          </p:cNvPr>
+          <p:cNvSpPr/>
+          <p:nvPr/>
+        </p:nvSpPr>
+        <p:spPr>
+          <a:xfrm>
+            <a:off x="2279242" y="1463941"/>
+            <a:ext cx="5797207" cy="3243191"/>
+          </a:xfrm>
+          <a:prstGeom prst="rect">
+            <a:avLst/>
+          </a:prstGeom>
+          <a:noFill/>
+          <a:ln>
+            <a:solidFill>
+              <a:schemeClr val="accent4"/>
+            </a:solidFill>
+          </a:ln>
+        </p:spPr>
+        <p:style>
+          <a:lnRef idx="2">
+            <a:schemeClr val="accent1">
+              <a:shade val="15000"/>
+            </a:schemeClr>
+          </a:lnRef>
+          <a:fillRef idx="1">
+            <a:schemeClr val="accent1"/>
+          </a:fillRef>
+          <a:effectRef idx="0">
+            <a:schemeClr val="accent1"/>
+          </a:effectRef>
+          <a:fontRef idx="minor">
+            <a:schemeClr val="lt1"/>
+          </a:fontRef>
+        </p:style>
+        <p:txBody>
+          <a:bodyPr rtlCol="0" anchor="ctr"/>
+          <a:lstStyle/>
+          <a:p>
+            <a:pPr algn="ctr"/>
+            <a:endParaRPr kumimoji="1" lang="ja-JP" altLang="en-US"/>
+          </a:p>
+        </p:txBody>
+      </p:sp>
+      <p:sp>
+        <p:nvSpPr>
+          <p:cNvPr id="4" name="四角形: 角を丸くする 3">
+            <a:extLst>
+              <a:ext uri="{FF2B5EF4-FFF2-40B4-BE49-F238E27FC236}">
+                <a16:creationId xmlns:a16="http://schemas.microsoft.com/office/drawing/2014/main" id="{867A7B5E-B28E-A423-C5F0-2AEA94AA8F54}"/>
+              </a:ext>
+            </a:extLst>
+          </p:cNvPr>
+          <p:cNvSpPr/>
+          <p:nvPr/>
+        </p:nvSpPr>
+        <p:spPr>
+          <a:xfrm>
+            <a:off x="2531493" y="3765706"/>
+            <a:ext cx="5297214" cy="743232"/>
+          </a:xfrm>
+          <a:prstGeom prst="roundRect">
+            <a:avLst/>
+          </a:prstGeom>
+        </p:spPr>
+        <p:style>
+          <a:lnRef idx="1">
+            <a:schemeClr val="accent4"/>
+          </a:lnRef>
+          <a:fillRef idx="3">
+            <a:schemeClr val="accent4"/>
+          </a:fillRef>
+          <a:effectRef idx="2">
+            <a:schemeClr val="accent4"/>
+          </a:effectRef>
+          <a:fontRef idx="minor">
+            <a:schemeClr val="lt1"/>
+          </a:fontRef>
+        </p:style>
+        <p:txBody>
+          <a:bodyPr rtlCol="0" anchor="ctr"/>
+          <a:lstStyle/>
+          <a:p>
+            <a:pPr algn="ctr"/>
+            <a:r>
+              <a:rPr kumimoji="1" lang="en-US" altLang="ja-JP" dirty="0"/>
+              <a:t>ASP.NET</a:t>
+            </a:r>
+            <a:r>
+              <a:rPr kumimoji="1" lang="ja-JP" altLang="en-US" dirty="0"/>
+              <a:t> </a:t>
+            </a:r>
+            <a:r>
+              <a:rPr kumimoji="1" lang="en-US" altLang="ja-JP" dirty="0"/>
+              <a:t>Core </a:t>
+            </a:r>
+            <a:r>
+              <a:rPr kumimoji="1" lang="ja-JP" altLang="en-US" dirty="0"/>
+              <a:t>フレームワーク</a:t>
+            </a:r>
+          </a:p>
+        </p:txBody>
+      </p:sp>
+      <p:sp>
+        <p:nvSpPr>
+          <p:cNvPr id="6" name="四角形: メモ 5">
+            <a:extLst>
+              <a:ext uri="{FF2B5EF4-FFF2-40B4-BE49-F238E27FC236}">
+                <a16:creationId xmlns:a16="http://schemas.microsoft.com/office/drawing/2014/main" id="{AD424D61-23E3-3EFB-5473-C8061EE42E29}"/>
+              </a:ext>
+            </a:extLst>
+          </p:cNvPr>
+          <p:cNvSpPr/>
+          <p:nvPr/>
+        </p:nvSpPr>
+        <p:spPr>
+          <a:xfrm>
+            <a:off x="2585773" y="1739942"/>
+            <a:ext cx="1877899" cy="1317339"/>
+          </a:xfrm>
+          <a:prstGeom prst="foldedCorner">
+            <a:avLst/>
+          </a:prstGeom>
+        </p:spPr>
+        <p:style>
+          <a:lnRef idx="1">
+            <a:schemeClr val="accent4"/>
+          </a:lnRef>
+          <a:fillRef idx="2">
+            <a:schemeClr val="accent4"/>
+          </a:fillRef>
+          <a:effectRef idx="1">
+            <a:schemeClr val="accent4"/>
+          </a:effectRef>
+          <a:fontRef idx="minor">
+            <a:schemeClr val="dk1"/>
+          </a:fontRef>
+        </p:style>
+        <p:txBody>
+          <a:bodyPr rtlCol="0" anchor="ctr"/>
+          <a:lstStyle/>
+          <a:p>
+            <a:pPr algn="ctr"/>
+            <a:r>
+              <a:rPr kumimoji="1" lang="ja-JP" altLang="en-US" dirty="0"/>
+              <a:t>ユーザー</a:t>
+            </a:r>
+            <a:endParaRPr kumimoji="1" lang="en-US" altLang="ja-JP" dirty="0"/>
+          </a:p>
+          <a:p>
+            <a:pPr algn="ctr"/>
+            <a:r>
+              <a:rPr kumimoji="1" lang="ja-JP" altLang="en-US" dirty="0"/>
+              <a:t>コード</a:t>
+            </a:r>
+          </a:p>
+        </p:txBody>
+      </p:sp>
+      <p:sp>
+        <p:nvSpPr>
+          <p:cNvPr id="7" name="四角形: 角を丸くする 6">
+            <a:extLst>
+              <a:ext uri="{FF2B5EF4-FFF2-40B4-BE49-F238E27FC236}">
+                <a16:creationId xmlns:a16="http://schemas.microsoft.com/office/drawing/2014/main" id="{678AEB32-6EF9-180D-F5BC-F9C8237A0AB7}"/>
+              </a:ext>
+            </a:extLst>
+          </p:cNvPr>
+          <p:cNvSpPr/>
+          <p:nvPr/>
+        </p:nvSpPr>
+        <p:spPr>
+          <a:xfrm>
+            <a:off x="5568981" y="1758794"/>
+            <a:ext cx="2261226" cy="1279634"/>
+          </a:xfrm>
+          <a:prstGeom prst="roundRect">
+            <a:avLst/>
+          </a:prstGeom>
+        </p:spPr>
+        <p:style>
+          <a:lnRef idx="1">
+            <a:schemeClr val="accent4"/>
+          </a:lnRef>
+          <a:fillRef idx="3">
+            <a:schemeClr val="accent4"/>
+          </a:fillRef>
+          <a:effectRef idx="2">
+            <a:schemeClr val="accent4"/>
+          </a:effectRef>
+          <a:fontRef idx="minor">
+            <a:schemeClr val="lt1"/>
+          </a:fontRef>
+        </p:style>
+        <p:txBody>
+          <a:bodyPr rtlCol="0" anchor="ctr"/>
+          <a:lstStyle/>
+          <a:p>
+            <a:pPr algn="ctr"/>
+            <a:r>
+              <a:rPr kumimoji="1" lang="ja-JP" altLang="en-US" dirty="0"/>
+              <a:t>非ユーザーコード</a:t>
+            </a:r>
+            <a:endParaRPr kumimoji="1" lang="en-US" altLang="ja-JP" dirty="0"/>
+          </a:p>
+          <a:p>
+            <a:pPr algn="ctr"/>
+            <a:r>
+              <a:rPr lang="ja-JP" altLang="en-US" dirty="0"/>
+              <a:t>（ライブラリ）</a:t>
+            </a:r>
+            <a:endParaRPr kumimoji="1" lang="ja-JP" altLang="en-US" dirty="0"/>
+          </a:p>
+        </p:txBody>
+      </p:sp>
+      <p:cxnSp>
+        <p:nvCxnSpPr>
+          <p:cNvPr id="9" name="直線矢印コネクタ 8">
+            <a:extLst>
+              <a:ext uri="{FF2B5EF4-FFF2-40B4-BE49-F238E27FC236}">
+                <a16:creationId xmlns:a16="http://schemas.microsoft.com/office/drawing/2014/main" id="{D247D849-2514-E843-2353-A7D529353CFC}"/>
+              </a:ext>
+            </a:extLst>
+          </p:cNvPr>
+          <p:cNvCxnSpPr>
+            <a:stCxn id="7" idx="3"/>
+          </p:cNvCxnSpPr>
+          <p:nvPr/>
+        </p:nvCxnSpPr>
+        <p:spPr>
+          <a:xfrm>
+            <a:off x="7830207" y="2398611"/>
+            <a:ext cx="1187669" cy="0"/>
+          </a:xfrm>
+          <a:prstGeom prst="straightConnector1">
+            <a:avLst/>
+          </a:prstGeom>
+          <a:ln>
+            <a:headEnd type="none" w="med" len="med"/>
+            <a:tailEnd type="arrow" w="med" len="med"/>
+          </a:ln>
+        </p:spPr>
+        <p:style>
+          <a:lnRef idx="2">
+            <a:schemeClr val="accent1"/>
+          </a:lnRef>
+          <a:fillRef idx="0">
+            <a:schemeClr val="accent1"/>
+          </a:fillRef>
+          <a:effectRef idx="1">
+            <a:schemeClr val="accent1"/>
+          </a:effectRef>
+          <a:fontRef idx="minor">
+            <a:schemeClr val="tx1"/>
+          </a:fontRef>
+        </p:style>
+      </p:cxnSp>
+      <p:cxnSp>
+        <p:nvCxnSpPr>
+          <p:cNvPr id="10" name="直線矢印コネクタ 9">
+            <a:extLst>
+              <a:ext uri="{FF2B5EF4-FFF2-40B4-BE49-F238E27FC236}">
+                <a16:creationId xmlns:a16="http://schemas.microsoft.com/office/drawing/2014/main" id="{859D43D1-592D-B8D8-B34D-33414D10C902}"/>
+              </a:ext>
+            </a:extLst>
+          </p:cNvPr>
+          <p:cNvCxnSpPr/>
+          <p:nvPr/>
+        </p:nvCxnSpPr>
+        <p:spPr>
+          <a:xfrm>
+            <a:off x="1343824" y="4132067"/>
+            <a:ext cx="1187669" cy="0"/>
+          </a:xfrm>
+          <a:prstGeom prst="straightConnector1">
+            <a:avLst/>
+          </a:prstGeom>
+          <a:ln>
+            <a:headEnd type="none" w="med" len="med"/>
+            <a:tailEnd type="arrow" w="med" len="med"/>
+          </a:ln>
+        </p:spPr>
+        <p:style>
+          <a:lnRef idx="2">
+            <a:schemeClr val="accent1"/>
+          </a:lnRef>
+          <a:fillRef idx="0">
+            <a:schemeClr val="accent1"/>
+          </a:fillRef>
+          <a:effectRef idx="1">
+            <a:schemeClr val="accent1"/>
+          </a:effectRef>
+          <a:fontRef idx="minor">
+            <a:schemeClr val="tx1"/>
+          </a:fontRef>
+        </p:style>
+      </p:cxnSp>
+      <p:cxnSp>
+        <p:nvCxnSpPr>
+          <p:cNvPr id="11" name="直線矢印コネクタ 10">
+            <a:extLst>
+              <a:ext uri="{FF2B5EF4-FFF2-40B4-BE49-F238E27FC236}">
+                <a16:creationId xmlns:a16="http://schemas.microsoft.com/office/drawing/2014/main" id="{328EBCCC-A59F-DBC1-FBE0-95C6AE9D1E2A}"/>
+              </a:ext>
+            </a:extLst>
+          </p:cNvPr>
+          <p:cNvCxnSpPr>
+            <a:cxnSpLocks/>
+            <a:endCxn id="6" idx="2"/>
+          </p:cNvCxnSpPr>
+          <p:nvPr/>
+        </p:nvCxnSpPr>
+        <p:spPr>
+          <a:xfrm flipV="1">
+            <a:off x="3524723" y="3057281"/>
+            <a:ext cx="0" cy="743232"/>
+          </a:xfrm>
+          <a:prstGeom prst="straightConnector1">
+            <a:avLst/>
+          </a:prstGeom>
+          <a:ln>
+            <a:headEnd type="none" w="med" len="med"/>
+            <a:tailEnd type="arrow" w="med" len="med"/>
+          </a:ln>
+        </p:spPr>
+        <p:style>
+          <a:lnRef idx="2">
+            <a:schemeClr val="accent1"/>
+          </a:lnRef>
+          <a:fillRef idx="0">
+            <a:schemeClr val="accent1"/>
+          </a:fillRef>
+          <a:effectRef idx="1">
+            <a:schemeClr val="accent1"/>
+          </a:effectRef>
+          <a:fontRef idx="minor">
+            <a:schemeClr val="tx1"/>
+          </a:fontRef>
+        </p:style>
+      </p:cxnSp>
+      <p:cxnSp>
+        <p:nvCxnSpPr>
+          <p:cNvPr id="14" name="直線矢印コネクタ 13">
+            <a:extLst>
+              <a:ext uri="{FF2B5EF4-FFF2-40B4-BE49-F238E27FC236}">
+                <a16:creationId xmlns:a16="http://schemas.microsoft.com/office/drawing/2014/main" id="{F8571AE8-3388-A296-2E2D-61E66B24AC10}"/>
+              </a:ext>
+            </a:extLst>
+          </p:cNvPr>
+          <p:cNvCxnSpPr>
+            <a:cxnSpLocks/>
+            <a:stCxn id="6" idx="3"/>
+            <a:endCxn id="7" idx="1"/>
+          </p:cNvCxnSpPr>
+          <p:nvPr/>
+        </p:nvCxnSpPr>
+        <p:spPr>
+          <a:xfrm flipV="1">
+            <a:off x="4463672" y="2398611"/>
+            <a:ext cx="1105309" cy="1"/>
+          </a:xfrm>
+          <a:prstGeom prst="straightConnector1">
+            <a:avLst/>
+          </a:prstGeom>
+          <a:ln>
+            <a:headEnd type="none" w="med" len="med"/>
+            <a:tailEnd type="arrow" w="med" len="med"/>
+          </a:ln>
+        </p:spPr>
+        <p:style>
+          <a:lnRef idx="2">
+            <a:schemeClr val="accent1"/>
+          </a:lnRef>
+          <a:fillRef idx="0">
+            <a:schemeClr val="accent1"/>
+          </a:fillRef>
+          <a:effectRef idx="1">
+            <a:schemeClr val="accent1"/>
+          </a:effectRef>
+          <a:fontRef idx="minor">
+            <a:schemeClr val="tx1"/>
+          </a:fontRef>
+        </p:style>
+      </p:cxnSp>
+      <p:sp>
+        <p:nvSpPr>
+          <p:cNvPr id="17" name="テキスト ボックス 16">
+            <a:extLst>
+              <a:ext uri="{FF2B5EF4-FFF2-40B4-BE49-F238E27FC236}">
+                <a16:creationId xmlns:a16="http://schemas.microsoft.com/office/drawing/2014/main" id="{AAEF0EF2-BB32-44A9-039F-CDE0899D6DF1}"/>
+              </a:ext>
+            </a:extLst>
+          </p:cNvPr>
+          <p:cNvSpPr txBox="1"/>
+          <p:nvPr/>
+        </p:nvSpPr>
+        <p:spPr>
+          <a:xfrm>
+            <a:off x="1088226" y="3716157"/>
+            <a:ext cx="1150305" cy="369332"/>
+          </a:xfrm>
+          <a:prstGeom prst="rect">
+            <a:avLst/>
+          </a:prstGeom>
+          <a:noFill/>
+        </p:spPr>
+        <p:txBody>
+          <a:bodyPr wrap="square" rtlCol="0">
+            <a:spAutoFit/>
+          </a:bodyPr>
+          <a:lstStyle/>
+          <a:p>
+            <a:pPr algn="ctr"/>
+            <a:r>
+              <a:rPr kumimoji="1" lang="en-US" altLang="ja-JP" dirty="0"/>
+              <a:t>HTTP</a:t>
+            </a:r>
+            <a:endParaRPr kumimoji="1" lang="ja-JP" altLang="en-US" dirty="0"/>
+          </a:p>
+        </p:txBody>
+      </p:sp>
+      <p:sp>
+        <p:nvSpPr>
+          <p:cNvPr id="18" name="テキスト ボックス 17">
+            <a:extLst>
+              <a:ext uri="{FF2B5EF4-FFF2-40B4-BE49-F238E27FC236}">
+                <a16:creationId xmlns:a16="http://schemas.microsoft.com/office/drawing/2014/main" id="{378A9A36-72B0-3D10-8CCE-CE573C4D0221}"/>
+              </a:ext>
+            </a:extLst>
+          </p:cNvPr>
+          <p:cNvSpPr txBox="1"/>
+          <p:nvPr/>
+        </p:nvSpPr>
+        <p:spPr>
+          <a:xfrm>
+            <a:off x="2888094" y="3232402"/>
+            <a:ext cx="1150305" cy="369332"/>
+          </a:xfrm>
+          <a:prstGeom prst="rect">
+            <a:avLst/>
+          </a:prstGeom>
+          <a:noFill/>
+        </p:spPr>
+        <p:txBody>
+          <a:bodyPr wrap="square" rtlCol="0">
+            <a:spAutoFit/>
+          </a:bodyPr>
+          <a:lstStyle/>
+          <a:p>
+            <a:pPr algn="ctr"/>
+            <a:r>
+              <a:rPr kumimoji="1" lang="en-US" altLang="ja-JP" dirty="0"/>
+              <a:t>Routing</a:t>
+            </a:r>
+            <a:endParaRPr kumimoji="1" lang="ja-JP" altLang="en-US" dirty="0"/>
+          </a:p>
+        </p:txBody>
+      </p:sp>
+      <p:sp>
+        <p:nvSpPr>
+          <p:cNvPr id="19" name="テキスト ボックス 18">
+            <a:extLst>
+              <a:ext uri="{FF2B5EF4-FFF2-40B4-BE49-F238E27FC236}">
+                <a16:creationId xmlns:a16="http://schemas.microsoft.com/office/drawing/2014/main" id="{BD0F014D-586F-8B29-7BFD-D1451B1685F0}"/>
+              </a:ext>
+            </a:extLst>
+          </p:cNvPr>
+          <p:cNvSpPr txBox="1"/>
+          <p:nvPr/>
+        </p:nvSpPr>
+        <p:spPr>
+          <a:xfrm>
+            <a:off x="4465177" y="2060826"/>
+            <a:ext cx="1150305" cy="369332"/>
+          </a:xfrm>
+          <a:prstGeom prst="rect">
+            <a:avLst/>
+          </a:prstGeom>
+          <a:noFill/>
+        </p:spPr>
+        <p:txBody>
+          <a:bodyPr wrap="square" rtlCol="0">
+            <a:spAutoFit/>
+          </a:bodyPr>
+          <a:lstStyle/>
+          <a:p>
+            <a:pPr algn="ctr"/>
+            <a:r>
+              <a:rPr kumimoji="1" lang="en-US" altLang="ja-JP" dirty="0"/>
+              <a:t>Call</a:t>
+            </a:r>
+            <a:endParaRPr kumimoji="1" lang="ja-JP" altLang="en-US" dirty="0"/>
+          </a:p>
+        </p:txBody>
+      </p:sp>
+      <p:sp>
+        <p:nvSpPr>
+          <p:cNvPr id="20" name="テキスト ボックス 19">
+            <a:extLst>
+              <a:ext uri="{FF2B5EF4-FFF2-40B4-BE49-F238E27FC236}">
+                <a16:creationId xmlns:a16="http://schemas.microsoft.com/office/drawing/2014/main" id="{7FBB4AB6-5C45-327D-68B1-5492077029BD}"/>
+              </a:ext>
+            </a:extLst>
+          </p:cNvPr>
+          <p:cNvSpPr txBox="1"/>
+          <p:nvPr/>
+        </p:nvSpPr>
+        <p:spPr>
+          <a:xfrm>
+            <a:off x="7901309" y="2029279"/>
+            <a:ext cx="1150305" cy="369332"/>
+          </a:xfrm>
+          <a:prstGeom prst="rect">
+            <a:avLst/>
+          </a:prstGeom>
+          <a:noFill/>
+        </p:spPr>
+        <p:txBody>
+          <a:bodyPr wrap="square" rtlCol="0">
+            <a:spAutoFit/>
+          </a:bodyPr>
+          <a:lstStyle/>
+          <a:p>
+            <a:pPr algn="ctr"/>
+            <a:r>
+              <a:rPr kumimoji="1" lang="en-US" altLang="ja-JP" dirty="0"/>
+              <a:t>Call</a:t>
+            </a:r>
+            <a:endParaRPr kumimoji="1" lang="ja-JP" altLang="en-US" dirty="0"/>
+          </a:p>
+        </p:txBody>
+      </p:sp>
+      <p:sp>
+        <p:nvSpPr>
+          <p:cNvPr id="22" name="四角形: 角を丸くする 21">
+            <a:extLst>
+              <a:ext uri="{FF2B5EF4-FFF2-40B4-BE49-F238E27FC236}">
+                <a16:creationId xmlns:a16="http://schemas.microsoft.com/office/drawing/2014/main" id="{9BE67061-F5D3-8BD9-CA4D-389EB4A56B01}"/>
+              </a:ext>
+            </a:extLst>
+          </p:cNvPr>
+          <p:cNvSpPr/>
+          <p:nvPr/>
+        </p:nvSpPr>
+        <p:spPr>
+          <a:xfrm>
+            <a:off x="9045719" y="1756542"/>
+            <a:ext cx="2261226" cy="1279634"/>
+          </a:xfrm>
+          <a:prstGeom prst="roundRect">
+            <a:avLst/>
+          </a:prstGeom>
+        </p:spPr>
+        <p:style>
+          <a:lnRef idx="1">
+            <a:schemeClr val="accent4"/>
+          </a:lnRef>
+          <a:fillRef idx="3">
+            <a:schemeClr val="accent4"/>
+          </a:fillRef>
+          <a:effectRef idx="2">
+            <a:schemeClr val="accent4"/>
+          </a:effectRef>
+          <a:fontRef idx="minor">
+            <a:schemeClr val="lt1"/>
+          </a:fontRef>
+        </p:style>
+        <p:txBody>
+          <a:bodyPr rtlCol="0" anchor="ctr"/>
+          <a:lstStyle/>
+          <a:p>
+            <a:pPr algn="ctr"/>
+            <a:r>
+              <a:rPr kumimoji="1" lang="ja-JP" altLang="en-US" dirty="0"/>
+              <a:t>外部サービス</a:t>
+            </a:r>
+            <a:endParaRPr kumimoji="1" lang="en-US" altLang="ja-JP" dirty="0"/>
+          </a:p>
+          <a:p>
+            <a:pPr algn="ctr"/>
+            <a:r>
+              <a:rPr lang="ja-JP" altLang="en-US" dirty="0"/>
+              <a:t>（</a:t>
+            </a:r>
+            <a:r>
+              <a:rPr lang="en-US" altLang="ja-JP" dirty="0"/>
+              <a:t>API, DB, </a:t>
+            </a:r>
+            <a:r>
+              <a:rPr lang="en-US" altLang="ja-JP" dirty="0" err="1"/>
+              <a:t>Etc</a:t>
+            </a:r>
+            <a:r>
+              <a:rPr lang="en-US" altLang="ja-JP" dirty="0"/>
+              <a:t>…)</a:t>
+            </a:r>
+            <a:endParaRPr kumimoji="1" lang="ja-JP" altLang="en-US" dirty="0"/>
+          </a:p>
+        </p:txBody>
+      </p:sp>
+      <p:cxnSp>
+        <p:nvCxnSpPr>
+          <p:cNvPr id="23" name="直線矢印コネクタ 22">
+            <a:extLst>
+              <a:ext uri="{FF2B5EF4-FFF2-40B4-BE49-F238E27FC236}">
+                <a16:creationId xmlns:a16="http://schemas.microsoft.com/office/drawing/2014/main" id="{8B3493D3-A6CA-1F8B-26CE-765CCF42F0D8}"/>
+              </a:ext>
+            </a:extLst>
+          </p:cNvPr>
+          <p:cNvCxnSpPr>
+            <a:cxnSpLocks/>
+          </p:cNvCxnSpPr>
+          <p:nvPr/>
+        </p:nvCxnSpPr>
+        <p:spPr>
+          <a:xfrm>
+            <a:off x="2888094" y="4508523"/>
+            <a:ext cx="0" cy="843898"/>
+          </a:xfrm>
+          <a:prstGeom prst="straightConnector1">
+            <a:avLst/>
+          </a:prstGeom>
+          <a:ln>
+            <a:solidFill>
+              <a:srgbClr val="FF0000"/>
+            </a:solidFill>
+            <a:prstDash val="dash"/>
+            <a:headEnd type="none" w="med" len="med"/>
+            <a:tailEnd type="arrow" w="med" len="med"/>
+          </a:ln>
+        </p:spPr>
+        <p:style>
+          <a:lnRef idx="2">
+            <a:schemeClr val="accent1"/>
+          </a:lnRef>
+          <a:fillRef idx="0">
+            <a:schemeClr val="accent1"/>
+          </a:fillRef>
+          <a:effectRef idx="1">
+            <a:schemeClr val="accent1"/>
+          </a:effectRef>
+          <a:fontRef idx="minor">
+            <a:schemeClr val="tx1"/>
+          </a:fontRef>
+        </p:style>
+      </p:cxnSp>
+      <p:cxnSp>
+        <p:nvCxnSpPr>
+          <p:cNvPr id="25" name="直線矢印コネクタ 24">
+            <a:extLst>
+              <a:ext uri="{FF2B5EF4-FFF2-40B4-BE49-F238E27FC236}">
+                <a16:creationId xmlns:a16="http://schemas.microsoft.com/office/drawing/2014/main" id="{30A4124E-75ED-BC3C-1EB0-CF0291FF1454}"/>
+              </a:ext>
+            </a:extLst>
+          </p:cNvPr>
+          <p:cNvCxnSpPr>
+            <a:cxnSpLocks/>
+          </p:cNvCxnSpPr>
+          <p:nvPr/>
+        </p:nvCxnSpPr>
+        <p:spPr>
+          <a:xfrm flipH="1">
+            <a:off x="4104877" y="3061371"/>
+            <a:ext cx="90" cy="2295140"/>
+          </a:xfrm>
+          <a:prstGeom prst="straightConnector1">
+            <a:avLst/>
+          </a:prstGeom>
+          <a:ln>
+            <a:solidFill>
+              <a:srgbClr val="FF0000"/>
+            </a:solidFill>
+            <a:prstDash val="dash"/>
+            <a:headEnd type="none" w="med" len="med"/>
+            <a:tailEnd type="arrow" w="med" len="med"/>
+          </a:ln>
+        </p:spPr>
+        <p:style>
+          <a:lnRef idx="2">
+            <a:schemeClr val="accent1"/>
+          </a:lnRef>
+          <a:fillRef idx="0">
+            <a:schemeClr val="accent1"/>
+          </a:fillRef>
+          <a:effectRef idx="1">
+            <a:schemeClr val="accent1"/>
+          </a:effectRef>
+          <a:fontRef idx="minor">
+            <a:schemeClr val="tx1"/>
+          </a:fontRef>
+        </p:style>
+      </p:cxnSp>
+      <p:cxnSp>
+        <p:nvCxnSpPr>
+          <p:cNvPr id="29" name="直線矢印コネクタ 28">
+            <a:extLst>
+              <a:ext uri="{FF2B5EF4-FFF2-40B4-BE49-F238E27FC236}">
+                <a16:creationId xmlns:a16="http://schemas.microsoft.com/office/drawing/2014/main" id="{074D0056-A839-C554-4C82-E34F25188883}"/>
+              </a:ext>
+            </a:extLst>
+          </p:cNvPr>
+          <p:cNvCxnSpPr>
+            <a:cxnSpLocks/>
+          </p:cNvCxnSpPr>
+          <p:nvPr/>
+        </p:nvCxnSpPr>
+        <p:spPr>
+          <a:xfrm flipH="1">
+            <a:off x="6572556" y="3038798"/>
+            <a:ext cx="90" cy="2295140"/>
+          </a:xfrm>
+          <a:prstGeom prst="straightConnector1">
+            <a:avLst/>
+          </a:prstGeom>
+          <a:ln>
+            <a:solidFill>
+              <a:srgbClr val="FF0000"/>
+            </a:solidFill>
+            <a:prstDash val="dash"/>
+            <a:headEnd type="none" w="med" len="med"/>
+            <a:tailEnd type="arrow" w="med" len="med"/>
+          </a:ln>
+        </p:spPr>
+        <p:style>
+          <a:lnRef idx="2">
+            <a:schemeClr val="accent1"/>
+          </a:lnRef>
+          <a:fillRef idx="0">
+            <a:schemeClr val="accent1"/>
+          </a:fillRef>
+          <a:effectRef idx="1">
+            <a:schemeClr val="accent1"/>
+          </a:effectRef>
+          <a:fontRef idx="minor">
+            <a:schemeClr val="tx1"/>
+          </a:fontRef>
+        </p:style>
+      </p:cxnSp>
+      <p:sp>
+        <p:nvSpPr>
+          <p:cNvPr id="30" name="正方形/長方形 29">
+            <a:extLst>
+              <a:ext uri="{FF2B5EF4-FFF2-40B4-BE49-F238E27FC236}">
+                <a16:creationId xmlns:a16="http://schemas.microsoft.com/office/drawing/2014/main" id="{67413201-F26F-188D-9FE3-79E909B77E62}"/>
+              </a:ext>
+            </a:extLst>
+          </p:cNvPr>
+          <p:cNvSpPr/>
+          <p:nvPr/>
+        </p:nvSpPr>
+        <p:spPr>
+          <a:xfrm>
+            <a:off x="2585773" y="5352421"/>
+            <a:ext cx="5242754" cy="749857"/>
+          </a:xfrm>
+          <a:prstGeom prst="rect">
+            <a:avLst/>
+          </a:prstGeom>
+        </p:spPr>
+        <p:style>
+          <a:lnRef idx="1">
+            <a:schemeClr val="accent2"/>
+          </a:lnRef>
+          <a:fillRef idx="2">
+            <a:schemeClr val="accent2"/>
+          </a:fillRef>
+          <a:effectRef idx="1">
+            <a:schemeClr val="accent2"/>
+          </a:effectRef>
+          <a:fontRef idx="minor">
+            <a:schemeClr val="dk1"/>
+          </a:fontRef>
+        </p:style>
+        <p:txBody>
+          <a:bodyPr rtlCol="0" anchor="ctr"/>
+          <a:lstStyle/>
+          <a:p>
+            <a:pPr algn="ctr"/>
+            <a:r>
+              <a:rPr lang="ja-JP" altLang="en-US" dirty="0"/>
+              <a:t>ログ</a:t>
+            </a:r>
+            <a:endParaRPr kumimoji="1" lang="ja-JP" altLang="en-US" dirty="0"/>
+          </a:p>
+        </p:txBody>
+      </p:sp>
+      <p:sp>
+        <p:nvSpPr>
+          <p:cNvPr id="31" name="テキスト ボックス 30">
+            <a:extLst>
+              <a:ext uri="{FF2B5EF4-FFF2-40B4-BE49-F238E27FC236}">
+                <a16:creationId xmlns:a16="http://schemas.microsoft.com/office/drawing/2014/main" id="{6DD2ECE9-15F0-441D-6905-EE2F339DBDF8}"/>
+              </a:ext>
+            </a:extLst>
+          </p:cNvPr>
+          <p:cNvSpPr txBox="1"/>
+          <p:nvPr/>
+        </p:nvSpPr>
+        <p:spPr>
+          <a:xfrm>
+            <a:off x="2106044" y="1117217"/>
+            <a:ext cx="2206640" cy="369332"/>
+          </a:xfrm>
+          <a:prstGeom prst="rect">
+            <a:avLst/>
+          </a:prstGeom>
+          <a:noFill/>
+        </p:spPr>
+        <p:txBody>
+          <a:bodyPr wrap="square" rtlCol="0">
+            <a:spAutoFit/>
+          </a:bodyPr>
+          <a:lstStyle/>
+          <a:p>
+            <a:pPr algn="ctr"/>
+            <a:r>
+              <a:rPr lang="ja-JP" altLang="en-US" dirty="0"/>
+              <a:t>アプリケーション</a:t>
+            </a:r>
+            <a:endParaRPr kumimoji="1" lang="ja-JP" altLang="en-US" dirty="0"/>
+          </a:p>
+        </p:txBody>
+      </p:sp>
+    </p:spTree>
+    <p:extLst>
+      <p:ext uri="{BB962C8B-B14F-4D97-AF65-F5344CB8AC3E}">
+        <p14:creationId xmlns:p14="http://schemas.microsoft.com/office/powerpoint/2010/main" val="3689791000"/>
+      </p:ext>
+    </p:extLst>
+  </p:cSld>
+  <p:clrMapOvr>
+    <a:masterClrMapping/>
+  </p:clrMapOvr>
+</p:sld>
+</file>
+
+<file path=ppt/slides/slide2.xml><?xml version="1.0" encoding="utf-8"?>
+<p:sld xmlns:a="http://schemas.openxmlformats.org/drawingml/2006/main" xmlns:r="http://schemas.openxmlformats.org/officeDocument/2006/relationships" xmlns:p="http://schemas.openxmlformats.org/presentationml/2006/main">
+  <p:cSld>
+    <p:spTree>
+      <p:nvGrpSpPr>
+        <p:cNvPr id="1" name=""/>
+        <p:cNvGrpSpPr/>
+        <p:nvPr/>
+      </p:nvGrpSpPr>
+      <p:grpSpPr>
+        <a:xfrm>
+          <a:off x="0" y="0"/>
+          <a:ext cx="0" cy="0"/>
+          <a:chOff x="0" y="0"/>
+          <a:chExt cx="0" cy="0"/>
+        </a:xfrm>
+      </p:grpSpPr>
       <p:pic>
         <p:nvPicPr>
           <p:cNvPr id="5" name="図 4">
@@ -3810,7 +4738,7 @@
 </p:sld>
 </file>
 
-<file path=ppt/slides/slide2.xml><?xml version="1.0" encoding="utf-8"?>
+<file path=ppt/slides/slide3.xml><?xml version="1.0" encoding="utf-8"?>
 <p:sld xmlns:a="http://schemas.openxmlformats.org/drawingml/2006/main" xmlns:r="http://schemas.openxmlformats.org/officeDocument/2006/relationships" xmlns:p="http://schemas.openxmlformats.org/presentationml/2006/main">
   <p:cSld>
     <p:spTree>
@@ -3870,7 +4798,7 @@
 </p:sld>
 </file>
 
-<file path=ppt/slides/slide3.xml><?xml version="1.0" encoding="utf-8"?>
+<file path=ppt/slides/slide4.xml><?xml version="1.0" encoding="utf-8"?>
 <p:sld xmlns:a="http://schemas.openxmlformats.org/drawingml/2006/main" xmlns:r="http://schemas.openxmlformats.org/officeDocument/2006/relationships" xmlns:p="http://schemas.openxmlformats.org/presentationml/2006/main">
   <p:cSld>
     <p:spTree>
@@ -3971,6 +4899,236 @@
     <p:extLst>
       <p:ext uri="{BB962C8B-B14F-4D97-AF65-F5344CB8AC3E}">
         <p14:creationId xmlns:p14="http://schemas.microsoft.com/office/powerpoint/2010/main" val="833132816"/>
+      </p:ext>
+    </p:extLst>
+  </p:cSld>
+  <p:clrMapOvr>
+    <a:masterClrMapping/>
+  </p:clrMapOvr>
+</p:sld>
+</file>
+
+<file path=ppt/slides/slide5.xml><?xml version="1.0" encoding="utf-8"?>
+<p:sld xmlns:a="http://schemas.openxmlformats.org/drawingml/2006/main" xmlns:r="http://schemas.openxmlformats.org/officeDocument/2006/relationships" xmlns:p="http://schemas.openxmlformats.org/presentationml/2006/main">
+  <p:cSld>
+    <p:spTree>
+      <p:nvGrpSpPr>
+        <p:cNvPr id="1" name=""/>
+        <p:cNvGrpSpPr/>
+        <p:nvPr/>
+      </p:nvGrpSpPr>
+      <p:grpSpPr>
+        <a:xfrm>
+          <a:off x="0" y="0"/>
+          <a:ext cx="0" cy="0"/>
+          <a:chOff x="0" y="0"/>
+          <a:chExt cx="0" cy="0"/>
+        </a:xfrm>
+      </p:grpSpPr>
+      <p:pic>
+        <p:nvPicPr>
+          <p:cNvPr id="3" name="図 2">
+            <a:extLst>
+              <a:ext uri="{FF2B5EF4-FFF2-40B4-BE49-F238E27FC236}">
+                <a16:creationId xmlns:a16="http://schemas.microsoft.com/office/drawing/2014/main" id="{42D117D3-9607-0464-27A3-783B4CA195C0}"/>
+              </a:ext>
+            </a:extLst>
+          </p:cNvPr>
+          <p:cNvPicPr>
+            <a:picLocks noChangeAspect="1"/>
+          </p:cNvPicPr>
+          <p:nvPr/>
+        </p:nvPicPr>
+        <p:blipFill>
+          <a:blip r:embed="rId2"/>
+          <a:stretch>
+            <a:fillRect/>
+          </a:stretch>
+        </p:blipFill>
+        <p:spPr>
+          <a:xfrm>
+            <a:off x="1515985" y="1231320"/>
+            <a:ext cx="9160030" cy="4395361"/>
+          </a:xfrm>
+          <a:prstGeom prst="rect">
+            <a:avLst/>
+          </a:prstGeom>
+        </p:spPr>
+      </p:pic>
+    </p:spTree>
+    <p:extLst>
+      <p:ext uri="{BB962C8B-B14F-4D97-AF65-F5344CB8AC3E}">
+        <p14:creationId xmlns:p14="http://schemas.microsoft.com/office/powerpoint/2010/main" val="1427798054"/>
+      </p:ext>
+    </p:extLst>
+  </p:cSld>
+  <p:clrMapOvr>
+    <a:masterClrMapping/>
+  </p:clrMapOvr>
+</p:sld>
+</file>
+
+<file path=ppt/slides/slide6.xml><?xml version="1.0" encoding="utf-8"?>
+<p:sld xmlns:a="http://schemas.openxmlformats.org/drawingml/2006/main" xmlns:r="http://schemas.openxmlformats.org/officeDocument/2006/relationships" xmlns:p="http://schemas.openxmlformats.org/presentationml/2006/main">
+  <p:cSld>
+    <p:spTree>
+      <p:nvGrpSpPr>
+        <p:cNvPr id="1" name=""/>
+        <p:cNvGrpSpPr/>
+        <p:nvPr/>
+      </p:nvGrpSpPr>
+      <p:grpSpPr>
+        <a:xfrm>
+          <a:off x="0" y="0"/>
+          <a:ext cx="0" cy="0"/>
+          <a:chOff x="0" y="0"/>
+          <a:chExt cx="0" cy="0"/>
+        </a:xfrm>
+      </p:grpSpPr>
+      <p:pic>
+        <p:nvPicPr>
+          <p:cNvPr id="3" name="図 2">
+            <a:extLst>
+              <a:ext uri="{FF2B5EF4-FFF2-40B4-BE49-F238E27FC236}">
+                <a16:creationId xmlns:a16="http://schemas.microsoft.com/office/drawing/2014/main" id="{D1EFFDEE-9B17-7D1A-14AE-D20A52BF2B81}"/>
+              </a:ext>
+            </a:extLst>
+          </p:cNvPr>
+          <p:cNvPicPr>
+            <a:picLocks noChangeAspect="1"/>
+          </p:cNvPicPr>
+          <p:nvPr/>
+        </p:nvPicPr>
+        <p:blipFill>
+          <a:blip r:embed="rId2"/>
+          <a:stretch>
+            <a:fillRect/>
+          </a:stretch>
+        </p:blipFill>
+        <p:spPr>
+          <a:xfrm>
+            <a:off x="1057984" y="765572"/>
+            <a:ext cx="10076033" cy="5326855"/>
+          </a:xfrm>
+          <a:prstGeom prst="rect">
+            <a:avLst/>
+          </a:prstGeom>
+        </p:spPr>
+      </p:pic>
+    </p:spTree>
+    <p:extLst>
+      <p:ext uri="{BB962C8B-B14F-4D97-AF65-F5344CB8AC3E}">
+        <p14:creationId xmlns:p14="http://schemas.microsoft.com/office/powerpoint/2010/main" val="2574754404"/>
+      </p:ext>
+    </p:extLst>
+  </p:cSld>
+  <p:clrMapOvr>
+    <a:masterClrMapping/>
+  </p:clrMapOvr>
+</p:sld>
+</file>
+
+<file path=ppt/slides/slide7.xml><?xml version="1.0" encoding="utf-8"?>
+<p:sld xmlns:a="http://schemas.openxmlformats.org/drawingml/2006/main" xmlns:r="http://schemas.openxmlformats.org/officeDocument/2006/relationships" xmlns:p="http://schemas.openxmlformats.org/presentationml/2006/main">
+  <p:cSld>
+    <p:spTree>
+      <p:nvGrpSpPr>
+        <p:cNvPr id="1" name=""/>
+        <p:cNvGrpSpPr/>
+        <p:nvPr/>
+      </p:nvGrpSpPr>
+      <p:grpSpPr>
+        <a:xfrm>
+          <a:off x="0" y="0"/>
+          <a:ext cx="0" cy="0"/>
+          <a:chOff x="0" y="0"/>
+          <a:chExt cx="0" cy="0"/>
+        </a:xfrm>
+      </p:grpSpPr>
+      <p:pic>
+        <p:nvPicPr>
+          <p:cNvPr id="3" name="図 2">
+            <a:extLst>
+              <a:ext uri="{FF2B5EF4-FFF2-40B4-BE49-F238E27FC236}">
+                <a16:creationId xmlns:a16="http://schemas.microsoft.com/office/drawing/2014/main" id="{2B2B9ACD-7720-765C-A5C5-D55108363CB5}"/>
+              </a:ext>
+            </a:extLst>
+          </p:cNvPr>
+          <p:cNvPicPr>
+            <a:picLocks noChangeAspect="1"/>
+          </p:cNvPicPr>
+          <p:nvPr/>
+        </p:nvPicPr>
+        <p:blipFill>
+          <a:blip r:embed="rId2"/>
+          <a:stretch>
+            <a:fillRect/>
+          </a:stretch>
+        </p:blipFill>
+        <p:spPr>
+          <a:xfrm>
+            <a:off x="196936" y="190126"/>
+            <a:ext cx="9160030" cy="3293115"/>
+          </a:xfrm>
+          <a:prstGeom prst="rect">
+            <a:avLst/>
+          </a:prstGeom>
+          <a:ln>
+            <a:noFill/>
+          </a:ln>
+          <a:effectLst>
+            <a:outerShdw blurRad="292100" dist="139700" dir="2700000" algn="tl" rotWithShape="0">
+              <a:srgbClr val="333333">
+                <a:alpha val="65000"/>
+              </a:srgbClr>
+            </a:outerShdw>
+          </a:effectLst>
+        </p:spPr>
+      </p:pic>
+      <p:pic>
+        <p:nvPicPr>
+          <p:cNvPr id="5" name="図 4">
+            <a:extLst>
+              <a:ext uri="{FF2B5EF4-FFF2-40B4-BE49-F238E27FC236}">
+                <a16:creationId xmlns:a16="http://schemas.microsoft.com/office/drawing/2014/main" id="{C1540A79-CE54-E16C-E8D9-5E67B7E8D71D}"/>
+              </a:ext>
+            </a:extLst>
+          </p:cNvPr>
+          <p:cNvPicPr>
+            <a:picLocks noChangeAspect="1"/>
+          </p:cNvPicPr>
+          <p:nvPr/>
+        </p:nvPicPr>
+        <p:blipFill>
+          <a:blip r:embed="rId3"/>
+          <a:stretch>
+            <a:fillRect/>
+          </a:stretch>
+        </p:blipFill>
+        <p:spPr>
+          <a:xfrm>
+            <a:off x="4465485" y="2455954"/>
+            <a:ext cx="7570273" cy="3386008"/>
+          </a:xfrm>
+          <a:prstGeom prst="rect">
+            <a:avLst/>
+          </a:prstGeom>
+          <a:ln>
+            <a:noFill/>
+          </a:ln>
+          <a:effectLst>
+            <a:outerShdw blurRad="292100" dist="139700" dir="2700000" algn="tl" rotWithShape="0">
+              <a:srgbClr val="333333">
+                <a:alpha val="65000"/>
+              </a:srgbClr>
+            </a:outerShdw>
+          </a:effectLst>
+        </p:spPr>
+      </p:pic>
+    </p:spTree>
+    <p:extLst>
+      <p:ext uri="{BB962C8B-B14F-4D97-AF65-F5344CB8AC3E}">
+        <p14:creationId xmlns:p14="http://schemas.microsoft.com/office/powerpoint/2010/main" val="3034299112"/>
       </p:ext>
     </p:extLst>
   </p:cSld>

</xml_diff>